<commit_message>
minor changes on pptx file. previous commit was the pdf.
</commit_message>
<xml_diff>
--- a/SHOUTING-PINWALL.pptx
+++ b/SHOUTING-PINWALL.pptx
@@ -10660,7 +10660,7 @@
             </a:pPr>
             <a:r>
               <a:rPr lang="de" sz="3000"/>
-              <a:t>User Cases</a:t>
+              <a:t>Use Cases</a:t>
             </a:r>
             <a:endParaRPr sz="3000"/>
           </a:p>
@@ -10725,7 +10725,7 @@
             </a:pPr>
             <a:r>
               <a:rPr lang="de"/>
-              <a:t>User Cases </a:t>
+              <a:t>Use Cases </a:t>
             </a:r>
             <a:r>
               <a:rPr lang="de" sz="1300"/>
@@ -10863,7 +10863,7 @@
             </a:pPr>
             <a:r>
               <a:rPr lang="de"/>
-              <a:t>User Cases </a:t>
+              <a:t>Use Cases </a:t>
             </a:r>
             <a:r>
               <a:rPr lang="de" sz="1300"/>
@@ -10960,7 +10960,7 @@
             </a:pPr>
             <a:r>
               <a:rPr lang="de"/>
-              <a:t>User Cases </a:t>
+              <a:t>Use Cases </a:t>
             </a:r>
             <a:r>
               <a:rPr lang="de" sz="1300"/>
@@ -11057,7 +11057,7 @@
             </a:pPr>
             <a:r>
               <a:rPr lang="de"/>
-              <a:t>Evavulation</a:t>
+              <a:t>Evaluation</a:t>
             </a:r>
             <a:endParaRPr/>
           </a:p>
@@ -11101,7 +11101,7 @@
             </a:pPr>
             <a:r>
               <a:rPr lang="de" sz="2000"/>
-              <a:t>We have achieved Overall 50% of Initial Plan.</a:t>
+              <a:t>Application is about 50% feature complete</a:t>
             </a:r>
             <a:endParaRPr sz="2000"/>
           </a:p>
@@ -11121,7 +11121,7 @@
             </a:pPr>
             <a:r>
               <a:rPr lang="de" sz="2000"/>
-              <a:t>Several Features still required to be added.</a:t>
+              <a:t>Some features are still required to be added.</a:t>
             </a:r>
             <a:endParaRPr sz="2000"/>
           </a:p>
@@ -11141,7 +11141,15 @@
             </a:pPr>
             <a:r>
               <a:rPr lang="de" sz="2000"/>
-              <a:t>Learned how to construct a DB using online services and integrate it with your application.</a:t>
+              <a:t>We learned how to construct a DB using online</a:t>
+            </a:r>
+            <a:r>
+              <a:rPr lang="de" sz="2000"/>
+              <a:t> </a:t>
+            </a:r>
+            <a:r>
+              <a:rPr lang="de" sz="2000"/>
+              <a:t>services and integrate into an application.</a:t>
             </a:r>
             <a:endParaRPr sz="2000"/>
           </a:p>
@@ -11277,14 +11285,15 @@
               <a:buNone/>
             </a:pPr>
             <a:r>
-              <a:rPr lang="de">
+              <a:rPr lang="de" u="sng">
                 <a:solidFill>
-                  <a:srgbClr val="FFFFFF"/>
+                  <a:schemeClr val="hlink"/>
                 </a:solidFill>
                 <a:latin typeface="Lato"/>
                 <a:ea typeface="Lato"/>
                 <a:cs typeface="Lato"/>
                 <a:sym typeface="Lato"/>
+                <a:hlinkClick r:id="rId5"/>
               </a:rPr>
               <a:t>https://youtu.be/XEz0Xrby4vg</a:t>
             </a:r>
@@ -11477,7 +11486,7 @@
                 <a:cs typeface="Lato"/>
                 <a:sym typeface="Lato"/>
               </a:rPr>
-              <a:t>we are making an </a:t>
+              <a:t>We are making an </a:t>
             </a:r>
             <a:r>
               <a:rPr b="1" lang="de" sz="1700" u="sng">
@@ -12153,6 +12162,46 @@
               <a:sym typeface="Lato"/>
             </a:endParaRPr>
           </a:p>
+          <a:p>
+            <a:pPr indent="-336550" lvl="0" marL="457200" rtl="0" algn="l">
+              <a:lnSpc>
+                <a:spcPct val="150000"/>
+              </a:lnSpc>
+              <a:spcBef>
+                <a:spcPts val="0"/>
+              </a:spcBef>
+              <a:spcAft>
+                <a:spcPts val="0"/>
+              </a:spcAft>
+              <a:buClr>
+                <a:srgbClr val="FFFFFF"/>
+              </a:buClr>
+              <a:buSzPts val="1700"/>
+              <a:buFont typeface="Lato"/>
+              <a:buChar char="●"/>
+            </a:pPr>
+            <a:r>
+              <a:rPr lang="de" sz="1700">
+                <a:solidFill>
+                  <a:srgbClr val="FFFFFF"/>
+                </a:solidFill>
+                <a:latin typeface="Lato"/>
+                <a:ea typeface="Lato"/>
+                <a:cs typeface="Lato"/>
+                <a:sym typeface="Lato"/>
+              </a:rPr>
+              <a:t>But there were problems...</a:t>
+            </a:r>
+            <a:endParaRPr sz="1700">
+              <a:solidFill>
+                <a:srgbClr val="FFFFFF"/>
+              </a:solidFill>
+              <a:latin typeface="Lato"/>
+              <a:ea typeface="Lato"/>
+              <a:cs typeface="Lato"/>
+              <a:sym typeface="Lato"/>
+            </a:endParaRPr>
+          </a:p>
         </p:txBody>
       </p:sp>
     </p:spTree>
@@ -12327,7 +12376,7 @@
             </a:pPr>
             <a:r>
               <a:rPr lang="de"/>
-              <a:t>View Post made by Others</a:t>
+              <a:t>View Posts made by Others</a:t>
             </a:r>
             <a:endParaRPr/>
           </a:p>

</xml_diff>